<commit_message>
emojis and link to site
</commit_message>
<xml_diff>
--- a/src/files/img.pptx
+++ b/src/files/img.pptx
@@ -259,7 +259,7 @@
           <a:p>
             <a:fld id="{87B70E9C-4457-48F5-993A-7CD259967FD8}" type="datetimeFigureOut">
               <a:rPr lang="en-US" smtClean="0"/>
-              <a:t>3/20/2023</a:t>
+              <a:t>10/6/2023</a:t>
             </a:fld>
             <a:endParaRPr lang="en-US"/>
           </a:p>
@@ -457,7 +457,7 @@
           <a:p>
             <a:fld id="{87B70E9C-4457-48F5-993A-7CD259967FD8}" type="datetimeFigureOut">
               <a:rPr lang="en-US" smtClean="0"/>
-              <a:t>3/20/2023</a:t>
+              <a:t>10/6/2023</a:t>
             </a:fld>
             <a:endParaRPr lang="en-US"/>
           </a:p>
@@ -665,7 +665,7 @@
           <a:p>
             <a:fld id="{87B70E9C-4457-48F5-993A-7CD259967FD8}" type="datetimeFigureOut">
               <a:rPr lang="en-US" smtClean="0"/>
-              <a:t>3/20/2023</a:t>
+              <a:t>10/6/2023</a:t>
             </a:fld>
             <a:endParaRPr lang="en-US"/>
           </a:p>
@@ -863,7 +863,7 @@
           <a:p>
             <a:fld id="{87B70E9C-4457-48F5-993A-7CD259967FD8}" type="datetimeFigureOut">
               <a:rPr lang="en-US" smtClean="0"/>
-              <a:t>3/20/2023</a:t>
+              <a:t>10/6/2023</a:t>
             </a:fld>
             <a:endParaRPr lang="en-US"/>
           </a:p>
@@ -1138,7 +1138,7 @@
           <a:p>
             <a:fld id="{87B70E9C-4457-48F5-993A-7CD259967FD8}" type="datetimeFigureOut">
               <a:rPr lang="en-US" smtClean="0"/>
-              <a:t>3/20/2023</a:t>
+              <a:t>10/6/2023</a:t>
             </a:fld>
             <a:endParaRPr lang="en-US"/>
           </a:p>
@@ -1403,7 +1403,7 @@
           <a:p>
             <a:fld id="{87B70E9C-4457-48F5-993A-7CD259967FD8}" type="datetimeFigureOut">
               <a:rPr lang="en-US" smtClean="0"/>
-              <a:t>3/20/2023</a:t>
+              <a:t>10/6/2023</a:t>
             </a:fld>
             <a:endParaRPr lang="en-US"/>
           </a:p>
@@ -1815,7 +1815,7 @@
           <a:p>
             <a:fld id="{87B70E9C-4457-48F5-993A-7CD259967FD8}" type="datetimeFigureOut">
               <a:rPr lang="en-US" smtClean="0"/>
-              <a:t>3/20/2023</a:t>
+              <a:t>10/6/2023</a:t>
             </a:fld>
             <a:endParaRPr lang="en-US"/>
           </a:p>
@@ -1956,7 +1956,7 @@
           <a:p>
             <a:fld id="{87B70E9C-4457-48F5-993A-7CD259967FD8}" type="datetimeFigureOut">
               <a:rPr lang="en-US" smtClean="0"/>
-              <a:t>3/20/2023</a:t>
+              <a:t>10/6/2023</a:t>
             </a:fld>
             <a:endParaRPr lang="en-US"/>
           </a:p>
@@ -2069,7 +2069,7 @@
           <a:p>
             <a:fld id="{87B70E9C-4457-48F5-993A-7CD259967FD8}" type="datetimeFigureOut">
               <a:rPr lang="en-US" smtClean="0"/>
-              <a:t>3/20/2023</a:t>
+              <a:t>10/6/2023</a:t>
             </a:fld>
             <a:endParaRPr lang="en-US"/>
           </a:p>
@@ -2380,7 +2380,7 @@
           <a:p>
             <a:fld id="{87B70E9C-4457-48F5-993A-7CD259967FD8}" type="datetimeFigureOut">
               <a:rPr lang="en-US" smtClean="0"/>
-              <a:t>3/20/2023</a:t>
+              <a:t>10/6/2023</a:t>
             </a:fld>
             <a:endParaRPr lang="en-US"/>
           </a:p>
@@ -2668,7 +2668,7 @@
           <a:p>
             <a:fld id="{87B70E9C-4457-48F5-993A-7CD259967FD8}" type="datetimeFigureOut">
               <a:rPr lang="en-US" smtClean="0"/>
-              <a:t>3/20/2023</a:t>
+              <a:t>10/6/2023</a:t>
             </a:fld>
             <a:endParaRPr lang="en-US"/>
           </a:p>
@@ -2909,7 +2909,7 @@
           <a:p>
             <a:fld id="{87B70E9C-4457-48F5-993A-7CD259967FD8}" type="datetimeFigureOut">
               <a:rPr lang="en-US" smtClean="0"/>
-              <a:t>3/20/2023</a:t>
+              <a:t>10/6/2023</a:t>
             </a:fld>
             <a:endParaRPr lang="en-US"/>
           </a:p>
@@ -3348,8 +3348,8 @@
         </p:nvSpPr>
         <p:spPr>
           <a:xfrm>
-            <a:off x="1852081" y="1533155"/>
-            <a:ext cx="5424256" cy="598688"/>
+            <a:off x="1284557" y="1533155"/>
+            <a:ext cx="6574932" cy="598688"/>
           </a:xfrm>
           <a:prstGeom prst="roundRect">
             <a:avLst/>
@@ -3414,7 +3414,7 @@
                 </a:solidFill>
                 <a:latin typeface="Modern Love" panose="04090805081005020601" pitchFamily="82" charset="0"/>
               </a:rPr>
-              <a:t>view my résumé</a:t>
+              <a:t>view my 📄 résumé 📄 </a:t>
             </a:r>
           </a:p>
         </p:txBody>
@@ -3499,7 +3499,7 @@
                 </a:solidFill>
                 <a:latin typeface="Modern Love" panose="04090805081005020601" pitchFamily="82" charset="0"/>
               </a:rPr>
-              <a:t>projects</a:t>
+              <a:t>🛠️ projects</a:t>
             </a:r>
           </a:p>
         </p:txBody>
@@ -3584,7 +3584,7 @@
                 </a:solidFill>
                 <a:latin typeface="Modern Love" panose="04090805081005020601" pitchFamily="82" charset="0"/>
               </a:rPr>
-              <a:t>languages</a:t>
+              <a:t>💬 languages</a:t>
             </a:r>
           </a:p>
         </p:txBody>
@@ -3669,7 +3669,7 @@
                 </a:solidFill>
                 <a:latin typeface="Modern Love" panose="04090805081005020601" pitchFamily="82" charset="0"/>
               </a:rPr>
-              <a:t>skills</a:t>
+              <a:t>🎯 skills</a:t>
             </a:r>
           </a:p>
         </p:txBody>
@@ -3754,7 +3754,7 @@
                 </a:solidFill>
                 <a:latin typeface="Modern Love" panose="04090805081005020601" pitchFamily="82" charset="0"/>
               </a:rPr>
-              <a:t>software</a:t>
+              <a:t>⚙️ software</a:t>
             </a:r>
           </a:p>
         </p:txBody>
@@ -4083,6 +4083,118 @@
               </a:rPr>
               <a:t>built with react. frontend and art designed by me. click me to visit the website!</a:t>
             </a:r>
+          </a:p>
+        </p:txBody>
+      </p:sp>
+      <p:sp>
+        <p:nvSpPr>
+          <p:cNvPr id="7" name="Rectangle: Rounded Corners 6">
+            <a:extLst>
+              <a:ext uri="{FF2B5EF4-FFF2-40B4-BE49-F238E27FC236}">
+                <a16:creationId xmlns:a16="http://schemas.microsoft.com/office/drawing/2014/main" id="{97BA38E2-303C-177C-DFF4-52B5D1EA3DF5}"/>
+              </a:ext>
+            </a:extLst>
+          </p:cNvPr>
+          <p:cNvSpPr/>
+          <p:nvPr/>
+        </p:nvSpPr>
+        <p:spPr>
+          <a:xfrm>
+            <a:off x="1276743" y="759038"/>
+            <a:ext cx="6574932" cy="598688"/>
+          </a:xfrm>
+          <a:prstGeom prst="roundRect">
+            <a:avLst/>
+          </a:prstGeom>
+          <a:gradFill flip="none" rotWithShape="1">
+            <a:gsLst>
+              <a:gs pos="0">
+                <a:srgbClr val="09257D"/>
+              </a:gs>
+              <a:gs pos="100000">
+                <a:srgbClr val="1C3158"/>
+              </a:gs>
+            </a:gsLst>
+            <a:path path="circle">
+              <a:fillToRect t="100000" r="100000"/>
+            </a:path>
+            <a:tileRect l="-100000" b="-100000"/>
+          </a:gradFill>
+          <a:ln>
+            <a:solidFill>
+              <a:schemeClr val="accent1">
+                <a:lumMod val="75000"/>
+              </a:schemeClr>
+            </a:solidFill>
+          </a:ln>
+          <a:effectLst>
+            <a:glow rad="63500">
+              <a:schemeClr val="accent1">
+                <a:satMod val="175000"/>
+                <a:alpha val="40000"/>
+              </a:schemeClr>
+            </a:glow>
+          </a:effectLst>
+        </p:spPr>
+        <p:style>
+          <a:lnRef idx="2">
+            <a:schemeClr val="accent1">
+              <a:shade val="50000"/>
+            </a:schemeClr>
+          </a:lnRef>
+          <a:fillRef idx="1">
+            <a:schemeClr val="accent1"/>
+          </a:fillRef>
+          <a:effectRef idx="0">
+            <a:schemeClr val="accent1"/>
+          </a:effectRef>
+          <a:fontRef idx="minor">
+            <a:schemeClr val="lt1"/>
+          </a:fontRef>
+        </p:style>
+        <p:txBody>
+          <a:bodyPr rtlCol="0" anchor="ctr"/>
+          <a:lstStyle/>
+          <a:p>
+            <a:pPr algn="ctr"/>
+            <a:r>
+              <a:rPr lang="en-US" sz="3200" dirty="0">
+                <a:solidFill>
+                  <a:schemeClr val="bg1">
+                    <a:lumMod val="85000"/>
+                  </a:schemeClr>
+                </a:solidFill>
+                <a:latin typeface="Modern Love" panose="04090805081005020601" pitchFamily="82" charset="0"/>
+              </a:rPr>
+              <a:t>visit my </a:t>
+            </a:r>
+            <a:r>
+              <a:rPr lang="en-US" sz="3200" dirty="0"/>
+              <a:t>🌐 </a:t>
+            </a:r>
+            <a:r>
+              <a:rPr lang="en-US" sz="3200" dirty="0">
+                <a:solidFill>
+                  <a:schemeClr val="bg1">
+                    <a:lumMod val="85000"/>
+                  </a:schemeClr>
+                </a:solidFill>
+                <a:latin typeface="Modern Love" panose="04090805081005020601" pitchFamily="82" charset="0"/>
+              </a:rPr>
+              <a:t>website </a:t>
+            </a:r>
+            <a:r>
+              <a:rPr lang="en-US" sz="3200" dirty="0"/>
+              <a:t>🌐 </a:t>
+            </a:r>
+            <a:endParaRPr lang="en-US" sz="3200" dirty="0">
+              <a:solidFill>
+                <a:schemeClr val="bg1">
+                  <a:lumMod val="85000"/>
+                </a:schemeClr>
+              </a:solidFill>
+              <a:latin typeface="Modern Love" panose="04090805081005020601" pitchFamily="82" charset="0"/>
+            </a:endParaRPr>
           </a:p>
         </p:txBody>
       </p:sp>

</xml_diff>